<commit_message>
Add split between deep and shallow networks with some initial setup
</commit_message>
<xml_diff>
--- a/doc/poster.pptx
+++ b/doc/poster.pptx
@@ -13730,11 +13730,14 @@
               <a:buSzPct val="25000"/>
               <a:buNone/>
             </a:pPr>
-            <a:endParaRPr lang="en-US" sz="3600" dirty="0">
-              <a:solidFill>
-                <a:schemeClr val="dk1"/>
-              </a:solidFill>
-            </a:endParaRPr>
+            <a:r>
+              <a:rPr lang="en-US" sz="3600" dirty="0">
+                <a:solidFill>
+                  <a:schemeClr val="dk1"/>
+                </a:solidFill>
+              </a:rPr>
+              <a:t>The goal of this project was to investigate how deep learning compares to non-deep learning, and ultimately to compare how 4 separate Remote Sensing tools perform during 5 fold cross validation. The four techniques chosen for comparison are: Shallow Residual Network, Shallow Convolutional Network, Deep Convolutional Network, and a Deep Residual Network. Two datasets were used for experimentation, one being a 3 class problem and the other being the UC Merced Benchmark Dataset, which is comprised of 21 classes with 100 training examples each. </a:t>
+            </a:r>
           </a:p>
         </p:txBody>
       </p:sp>
@@ -13889,19 +13892,32 @@
                   <a:cs typeface="Times New Roman" panose="02020603050405020304"/>
                   <a:sym typeface="Times New Roman" panose="02020603050405020304"/>
                 </a:rPr>
-                <a:t>Convolutional Neural Networks with Minimal Layers For Remote Sensing Using Benchmark Datasets</a:t>
+                <a:t>Convolutional Neural Networks:</a:t>
               </a:r>
             </a:p>
             <a:p>
               <a:pPr marL="0" marR="0" lvl="0" indent="0" algn="ctr" rtl="0">
                 <a:spcBef>
-                  <a:spcPts val="2400"/>
+                  <a:spcPts val="0"/>
                 </a:spcBef>
                 <a:spcAft>
                   <a:spcPts val="0"/>
                 </a:spcAft>
+                <a:buSzPct val="25000"/>
                 <a:buNone/>
               </a:pPr>
+              <a:r>
+                <a:rPr lang="en-US" sz="7200" b="1" dirty="0">
+                  <a:solidFill>
+                    <a:schemeClr val="dk1"/>
+                  </a:solidFill>
+                  <a:latin typeface="Times New Roman" panose="02020603050405020304"/>
+                  <a:ea typeface="Times New Roman" panose="02020603050405020304"/>
+                  <a:cs typeface="Times New Roman" panose="02020603050405020304"/>
+                  <a:sym typeface="Times New Roman" panose="02020603050405020304"/>
+                </a:rPr>
+                <a:t>Do we need deep networks?</a:t>
+              </a:r>
               <a:endParaRPr sz="1000" b="1" dirty="0">
                 <a:solidFill>
                   <a:schemeClr val="dk1"/>

</xml_diff>